<commit_message>
Added power rail block diagrams.
</commit_message>
<xml_diff>
--- a/hardware/MainBoard/Misc/BlockDiagram.pptx
+++ b/hardware/MainBoard/Misc/BlockDiagram.pptx
@@ -8,6 +8,8 @@
     <p:sldId id="256" r:id="rId2"/>
     <p:sldId id="257" r:id="rId3"/>
     <p:sldId id="258" r:id="rId4"/>
+    <p:sldId id="259" r:id="rId5"/>
+    <p:sldId id="260" r:id="rId6"/>
   </p:sldIdLst>
   <p:sldSz cx="9144000" cy="6858000" type="screen4x3"/>
   <p:notesSz cx="6858000" cy="9144000"/>
@@ -291,7 +293,7 @@
             <a:fld id="{1D8BD707-D9CF-40AE-B4C6-C98DA3205C09}" type="datetimeFigureOut">
               <a:rPr lang="en-US" smtClean="0"/>
               <a:pPr/>
-              <a:t>5/26/2011</a:t>
+              <a:t>12/12/2011</a:t>
             </a:fld>
             <a:endParaRPr lang="en-US"/>
           </a:p>
@@ -458,7 +460,7 @@
             <a:fld id="{1D8BD707-D9CF-40AE-B4C6-C98DA3205C09}" type="datetimeFigureOut">
               <a:rPr lang="en-US" smtClean="0"/>
               <a:pPr/>
-              <a:t>5/26/2011</a:t>
+              <a:t>12/12/2011</a:t>
             </a:fld>
             <a:endParaRPr lang="en-US"/>
           </a:p>
@@ -635,7 +637,7 @@
             <a:fld id="{1D8BD707-D9CF-40AE-B4C6-C98DA3205C09}" type="datetimeFigureOut">
               <a:rPr lang="en-US" smtClean="0"/>
               <a:pPr/>
-              <a:t>5/26/2011</a:t>
+              <a:t>12/12/2011</a:t>
             </a:fld>
             <a:endParaRPr lang="en-US"/>
           </a:p>
@@ -802,7 +804,7 @@
             <a:fld id="{1D8BD707-D9CF-40AE-B4C6-C98DA3205C09}" type="datetimeFigureOut">
               <a:rPr lang="en-US" smtClean="0"/>
               <a:pPr/>
-              <a:t>5/26/2011</a:t>
+              <a:t>12/12/2011</a:t>
             </a:fld>
             <a:endParaRPr lang="en-US"/>
           </a:p>
@@ -1045,7 +1047,7 @@
             <a:fld id="{1D8BD707-D9CF-40AE-B4C6-C98DA3205C09}" type="datetimeFigureOut">
               <a:rPr lang="en-US" smtClean="0"/>
               <a:pPr/>
-              <a:t>5/26/2011</a:t>
+              <a:t>12/12/2011</a:t>
             </a:fld>
             <a:endParaRPr lang="en-US"/>
           </a:p>
@@ -1330,7 +1332,7 @@
             <a:fld id="{1D8BD707-D9CF-40AE-B4C6-C98DA3205C09}" type="datetimeFigureOut">
               <a:rPr lang="en-US" smtClean="0"/>
               <a:pPr/>
-              <a:t>5/26/2011</a:t>
+              <a:t>12/12/2011</a:t>
             </a:fld>
             <a:endParaRPr lang="en-US"/>
           </a:p>
@@ -1749,7 +1751,7 @@
             <a:fld id="{1D8BD707-D9CF-40AE-B4C6-C98DA3205C09}" type="datetimeFigureOut">
               <a:rPr lang="en-US" smtClean="0"/>
               <a:pPr/>
-              <a:t>5/26/2011</a:t>
+              <a:t>12/12/2011</a:t>
             </a:fld>
             <a:endParaRPr lang="en-US"/>
           </a:p>
@@ -1864,7 +1866,7 @@
             <a:fld id="{1D8BD707-D9CF-40AE-B4C6-C98DA3205C09}" type="datetimeFigureOut">
               <a:rPr lang="en-US" smtClean="0"/>
               <a:pPr/>
-              <a:t>5/26/2011</a:t>
+              <a:t>12/12/2011</a:t>
             </a:fld>
             <a:endParaRPr lang="en-US"/>
           </a:p>
@@ -1956,7 +1958,7 @@
             <a:fld id="{1D8BD707-D9CF-40AE-B4C6-C98DA3205C09}" type="datetimeFigureOut">
               <a:rPr lang="en-US" smtClean="0"/>
               <a:pPr/>
-              <a:t>5/26/2011</a:t>
+              <a:t>12/12/2011</a:t>
             </a:fld>
             <a:endParaRPr lang="en-US"/>
           </a:p>
@@ -2230,7 +2232,7 @@
             <a:fld id="{1D8BD707-D9CF-40AE-B4C6-C98DA3205C09}" type="datetimeFigureOut">
               <a:rPr lang="en-US" smtClean="0"/>
               <a:pPr/>
-              <a:t>5/26/2011</a:t>
+              <a:t>12/12/2011</a:t>
             </a:fld>
             <a:endParaRPr lang="en-US"/>
           </a:p>
@@ -2480,7 +2482,7 @@
             <a:fld id="{1D8BD707-D9CF-40AE-B4C6-C98DA3205C09}" type="datetimeFigureOut">
               <a:rPr lang="en-US" smtClean="0"/>
               <a:pPr/>
-              <a:t>5/26/2011</a:t>
+              <a:t>12/12/2011</a:t>
             </a:fld>
             <a:endParaRPr lang="en-US"/>
           </a:p>
@@ -2690,7 +2692,7 @@
             <a:fld id="{1D8BD707-D9CF-40AE-B4C6-C98DA3205C09}" type="datetimeFigureOut">
               <a:rPr lang="en-US" smtClean="0"/>
               <a:pPr/>
-              <a:t>5/26/2011</a:t>
+              <a:t>12/12/2011</a:t>
             </a:fld>
             <a:endParaRPr lang="en-US"/>
           </a:p>
@@ -4951,6 +4953,1982 @@
         </p:style>
       </p:cxnSp>
     </p:spTree>
+  </p:cSld>
+  <p:clrMapOvr>
+    <a:masterClrMapping/>
+  </p:clrMapOvr>
+</p:sld>
+</file>
+
+<file path=ppt/slides/slide4.xml><?xml version="1.0" encoding="utf-8"?>
+<p:sld xmlns:a="http://schemas.openxmlformats.org/drawingml/2006/main" xmlns:r="http://schemas.openxmlformats.org/officeDocument/2006/relationships" xmlns:p="http://schemas.openxmlformats.org/presentationml/2006/main">
+  <p:cSld>
+    <p:spTree>
+      <p:nvGrpSpPr>
+        <p:cNvPr id="1" name=""/>
+        <p:cNvGrpSpPr/>
+        <p:nvPr/>
+      </p:nvGrpSpPr>
+      <p:grpSpPr>
+        <a:xfrm>
+          <a:off x="0" y="0"/>
+          <a:ext cx="0" cy="0"/>
+          <a:chOff x="0" y="0"/>
+          <a:chExt cx="0" cy="0"/>
+        </a:xfrm>
+      </p:grpSpPr>
+      <p:grpSp>
+        <p:nvGrpSpPr>
+          <p:cNvPr id="4" name="Group 3"/>
+          <p:cNvGrpSpPr/>
+          <p:nvPr/>
+        </p:nvGrpSpPr>
+        <p:grpSpPr>
+          <a:xfrm>
+            <a:off x="3956492" y="2610934"/>
+            <a:ext cx="1453662" cy="1453662"/>
+            <a:chOff x="5181600" y="2683669"/>
+            <a:chExt cx="1188720" cy="1185862"/>
+          </a:xfrm>
+        </p:grpSpPr>
+        <p:pic>
+          <p:nvPicPr>
+            <p:cNvPr id="5" name="Picture 2"/>
+            <p:cNvPicPr>
+              <a:picLocks noChangeAspect="1" noChangeArrowheads="1"/>
+            </p:cNvPicPr>
+            <p:nvPr/>
+          </p:nvPicPr>
+          <p:blipFill>
+            <a:blip r:embed="rId2" cstate="print"/>
+            <a:srcRect/>
+            <a:stretch>
+              <a:fillRect/>
+            </a:stretch>
+          </p:blipFill>
+          <p:spPr bwMode="auto">
+            <a:xfrm>
+              <a:off x="5334000" y="2819400"/>
+              <a:ext cx="914400" cy="904097"/>
+            </a:xfrm>
+            <a:prstGeom prst="rect">
+              <a:avLst/>
+            </a:prstGeom>
+            <a:noFill/>
+            <a:ln w="9525">
+              <a:noFill/>
+              <a:miter lim="800000"/>
+              <a:headEnd/>
+              <a:tailEnd/>
+            </a:ln>
+          </p:spPr>
+        </p:pic>
+        <p:sp>
+          <p:nvSpPr>
+            <p:cNvPr id="6" name="Rectangle 5"/>
+            <p:cNvSpPr/>
+            <p:nvPr/>
+          </p:nvSpPr>
+          <p:spPr>
+            <a:xfrm>
+              <a:off x="5181600" y="2683669"/>
+              <a:ext cx="1188720" cy="1185862"/>
+            </a:xfrm>
+            <a:prstGeom prst="rect">
+              <a:avLst/>
+            </a:prstGeom>
+            <a:noFill/>
+            <a:ln w="38100" cap="sq">
+              <a:solidFill>
+                <a:schemeClr val="tx1"/>
+              </a:solidFill>
+              <a:miter lim="800000"/>
+            </a:ln>
+          </p:spPr>
+          <p:style>
+            <a:lnRef idx="2">
+              <a:schemeClr val="accent1">
+                <a:shade val="50000"/>
+              </a:schemeClr>
+            </a:lnRef>
+            <a:fillRef idx="1">
+              <a:schemeClr val="accent1"/>
+            </a:fillRef>
+            <a:effectRef idx="0">
+              <a:schemeClr val="accent1"/>
+            </a:effectRef>
+            <a:fontRef idx="minor">
+              <a:schemeClr val="lt1"/>
+            </a:fontRef>
+          </p:style>
+          <p:txBody>
+            <a:bodyPr rtlCol="0" anchor="ctr"/>
+            <a:lstStyle/>
+            <a:p>
+              <a:pPr algn="ctr"/>
+              <a:endParaRPr lang="en-US" sz="1400"/>
+            </a:p>
+          </p:txBody>
+        </p:sp>
+      </p:grpSp>
+      <p:sp>
+        <p:nvSpPr>
+          <p:cNvPr id="7" name="Rectangle 6"/>
+          <p:cNvSpPr/>
+          <p:nvPr/>
+        </p:nvSpPr>
+        <p:spPr>
+          <a:xfrm>
+            <a:off x="3956492" y="4434840"/>
+            <a:ext cx="1453662" cy="640901"/>
+          </a:xfrm>
+          <a:prstGeom prst="rect">
+            <a:avLst/>
+          </a:prstGeom>
+          <a:noFill/>
+          <a:ln w="38100" cap="sq">
+            <a:solidFill>
+              <a:schemeClr val="tx1"/>
+            </a:solidFill>
+            <a:miter lim="800000"/>
+          </a:ln>
+        </p:spPr>
+        <p:style>
+          <a:lnRef idx="2">
+            <a:schemeClr val="accent1">
+              <a:shade val="50000"/>
+            </a:schemeClr>
+          </a:lnRef>
+          <a:fillRef idx="1">
+            <a:schemeClr val="accent1"/>
+          </a:fillRef>
+          <a:effectRef idx="0">
+            <a:schemeClr val="accent1"/>
+          </a:effectRef>
+          <a:fontRef idx="minor">
+            <a:schemeClr val="lt1"/>
+          </a:fontRef>
+        </p:style>
+        <p:txBody>
+          <a:bodyPr rtlCol="0" anchor="ctr">
+            <a:noAutofit/>
+          </a:bodyPr>
+          <a:lstStyle/>
+          <a:p>
+            <a:pPr algn="ctr"/>
+            <a:r>
+              <a:rPr lang="en-US" dirty="0" smtClean="0">
+                <a:solidFill>
+                  <a:schemeClr val="tx1"/>
+                </a:solidFill>
+                <a:latin typeface="Tahoma" pitchFamily="34" charset="0"/>
+                <a:ea typeface="Tahoma" pitchFamily="34" charset="0"/>
+                <a:cs typeface="Tahoma" pitchFamily="34" charset="0"/>
+              </a:rPr>
+              <a:t>SRAM</a:t>
+            </a:r>
+            <a:endParaRPr lang="en-US" dirty="0">
+              <a:solidFill>
+                <a:schemeClr val="tx1"/>
+              </a:solidFill>
+              <a:latin typeface="Tahoma" pitchFamily="34" charset="0"/>
+              <a:ea typeface="Tahoma" pitchFamily="34" charset="0"/>
+              <a:cs typeface="Tahoma" pitchFamily="34" charset="0"/>
+            </a:endParaRPr>
+          </a:p>
+        </p:txBody>
+      </p:sp>
+      <p:sp>
+        <p:nvSpPr>
+          <p:cNvPr id="13" name="Rectangle 12"/>
+          <p:cNvSpPr/>
+          <p:nvPr/>
+        </p:nvSpPr>
+        <p:spPr>
+          <a:xfrm>
+            <a:off x="2286000" y="5440680"/>
+            <a:ext cx="4572000" cy="548640"/>
+          </a:xfrm>
+          <a:prstGeom prst="rect">
+            <a:avLst/>
+          </a:prstGeom>
+          <a:noFill/>
+          <a:ln w="38100" cap="sq">
+            <a:solidFill>
+              <a:schemeClr val="tx1"/>
+            </a:solidFill>
+            <a:miter lim="800000"/>
+          </a:ln>
+        </p:spPr>
+        <p:style>
+          <a:lnRef idx="2">
+            <a:schemeClr val="accent1">
+              <a:shade val="50000"/>
+            </a:schemeClr>
+          </a:lnRef>
+          <a:fillRef idx="1">
+            <a:schemeClr val="accent1"/>
+          </a:fillRef>
+          <a:effectRef idx="0">
+            <a:schemeClr val="accent1"/>
+          </a:effectRef>
+          <a:fontRef idx="minor">
+            <a:schemeClr val="lt1"/>
+          </a:fontRef>
+        </p:style>
+        <p:txBody>
+          <a:bodyPr rtlCol="0" anchor="ctr">
+            <a:noAutofit/>
+          </a:bodyPr>
+          <a:lstStyle/>
+          <a:p>
+            <a:pPr algn="ctr"/>
+            <a:r>
+              <a:rPr lang="en-US" dirty="0" smtClean="0">
+                <a:solidFill>
+                  <a:schemeClr val="tx1"/>
+                </a:solidFill>
+                <a:latin typeface="Tahoma" pitchFamily="34" charset="0"/>
+                <a:ea typeface="Tahoma" pitchFamily="34" charset="0"/>
+                <a:cs typeface="Tahoma" pitchFamily="34" charset="0"/>
+              </a:rPr>
+              <a:t>South Bridge</a:t>
+            </a:r>
+            <a:endParaRPr lang="en-US" dirty="0">
+              <a:solidFill>
+                <a:schemeClr val="tx1"/>
+              </a:solidFill>
+              <a:latin typeface="Tahoma" pitchFamily="34" charset="0"/>
+              <a:ea typeface="Tahoma" pitchFamily="34" charset="0"/>
+              <a:cs typeface="Tahoma" pitchFamily="34" charset="0"/>
+            </a:endParaRPr>
+          </a:p>
+        </p:txBody>
+      </p:sp>
+      <p:sp>
+        <p:nvSpPr>
+          <p:cNvPr id="14" name="Rectangle 13"/>
+          <p:cNvSpPr/>
+          <p:nvPr/>
+        </p:nvSpPr>
+        <p:spPr>
+          <a:xfrm>
+            <a:off x="2286000" y="822960"/>
+            <a:ext cx="4572000" cy="548640"/>
+          </a:xfrm>
+          <a:prstGeom prst="rect">
+            <a:avLst/>
+          </a:prstGeom>
+          <a:noFill/>
+          <a:ln w="38100" cap="sq">
+            <a:solidFill>
+              <a:schemeClr val="tx1"/>
+            </a:solidFill>
+            <a:miter lim="800000"/>
+          </a:ln>
+        </p:spPr>
+        <p:style>
+          <a:lnRef idx="2">
+            <a:schemeClr val="accent1">
+              <a:shade val="50000"/>
+            </a:schemeClr>
+          </a:lnRef>
+          <a:fillRef idx="1">
+            <a:schemeClr val="accent1"/>
+          </a:fillRef>
+          <a:effectRef idx="0">
+            <a:schemeClr val="accent1"/>
+          </a:effectRef>
+          <a:fontRef idx="minor">
+            <a:schemeClr val="lt1"/>
+          </a:fontRef>
+        </p:style>
+        <p:txBody>
+          <a:bodyPr rtlCol="0" anchor="ctr">
+            <a:noAutofit/>
+          </a:bodyPr>
+          <a:lstStyle/>
+          <a:p>
+            <a:pPr algn="ctr"/>
+            <a:r>
+              <a:rPr lang="en-US" dirty="0" smtClean="0">
+                <a:solidFill>
+                  <a:schemeClr val="tx1"/>
+                </a:solidFill>
+                <a:latin typeface="Tahoma" pitchFamily="34" charset="0"/>
+                <a:ea typeface="Tahoma" pitchFamily="34" charset="0"/>
+                <a:cs typeface="Tahoma" pitchFamily="34" charset="0"/>
+              </a:rPr>
+              <a:t>North Bridge</a:t>
+            </a:r>
+            <a:endParaRPr lang="en-US" dirty="0">
+              <a:solidFill>
+                <a:schemeClr val="tx1"/>
+              </a:solidFill>
+              <a:latin typeface="Tahoma" pitchFamily="34" charset="0"/>
+              <a:ea typeface="Tahoma" pitchFamily="34" charset="0"/>
+              <a:cs typeface="Tahoma" pitchFamily="34" charset="0"/>
+            </a:endParaRPr>
+          </a:p>
+        </p:txBody>
+      </p:sp>
+      <p:cxnSp>
+        <p:nvCxnSpPr>
+          <p:cNvPr id="40" name="Straight Arrow Connector 39"/>
+          <p:cNvCxnSpPr/>
+          <p:nvPr/>
+        </p:nvCxnSpPr>
+        <p:spPr>
+          <a:xfrm>
+            <a:off x="2698274" y="1372394"/>
+            <a:ext cx="0" cy="4068286"/>
+          </a:xfrm>
+          <a:prstGeom prst="straightConnector1">
+            <a:avLst/>
+          </a:prstGeom>
+          <a:ln w="38100">
+            <a:solidFill>
+              <a:schemeClr val="tx1"/>
+            </a:solidFill>
+            <a:headEnd type="triangle" w="lg" len="med"/>
+            <a:tailEnd type="triangle" w="lg" len="med"/>
+          </a:ln>
+        </p:spPr>
+        <p:style>
+          <a:lnRef idx="1">
+            <a:schemeClr val="accent1"/>
+          </a:lnRef>
+          <a:fillRef idx="0">
+            <a:schemeClr val="accent1"/>
+          </a:fillRef>
+          <a:effectRef idx="0">
+            <a:schemeClr val="accent1"/>
+          </a:effectRef>
+          <a:fontRef idx="minor">
+            <a:schemeClr val="tx1"/>
+          </a:fontRef>
+        </p:style>
+      </p:cxnSp>
+      <p:cxnSp>
+        <p:nvCxnSpPr>
+          <p:cNvPr id="45" name="Straight Arrow Connector 44"/>
+          <p:cNvCxnSpPr/>
+          <p:nvPr/>
+        </p:nvCxnSpPr>
+        <p:spPr>
+          <a:xfrm>
+            <a:off x="3063240" y="1372394"/>
+            <a:ext cx="0" cy="4068286"/>
+          </a:xfrm>
+          <a:prstGeom prst="straightConnector1">
+            <a:avLst/>
+          </a:prstGeom>
+          <a:ln w="38100">
+            <a:solidFill>
+              <a:schemeClr val="tx1"/>
+            </a:solidFill>
+            <a:headEnd type="triangle" w="lg" len="med"/>
+            <a:tailEnd type="triangle" w="lg" len="med"/>
+          </a:ln>
+        </p:spPr>
+        <p:style>
+          <a:lnRef idx="1">
+            <a:schemeClr val="accent1"/>
+          </a:lnRef>
+          <a:fillRef idx="0">
+            <a:schemeClr val="accent1"/>
+          </a:fillRef>
+          <a:effectRef idx="0">
+            <a:schemeClr val="accent1"/>
+          </a:effectRef>
+          <a:fontRef idx="minor">
+            <a:schemeClr val="tx1"/>
+          </a:fontRef>
+        </p:style>
+      </p:cxnSp>
+      <p:cxnSp>
+        <p:nvCxnSpPr>
+          <p:cNvPr id="47" name="Straight Arrow Connector 46"/>
+          <p:cNvCxnSpPr/>
+          <p:nvPr/>
+        </p:nvCxnSpPr>
+        <p:spPr>
+          <a:xfrm>
+            <a:off x="6080760" y="1372394"/>
+            <a:ext cx="0" cy="4068286"/>
+          </a:xfrm>
+          <a:prstGeom prst="straightConnector1">
+            <a:avLst/>
+          </a:prstGeom>
+          <a:ln w="38100">
+            <a:solidFill>
+              <a:schemeClr val="tx1"/>
+            </a:solidFill>
+            <a:headEnd type="triangle" w="lg" len="med"/>
+            <a:tailEnd type="triangle" w="lg" len="med"/>
+          </a:ln>
+        </p:spPr>
+        <p:style>
+          <a:lnRef idx="1">
+            <a:schemeClr val="accent1"/>
+          </a:lnRef>
+          <a:fillRef idx="0">
+            <a:schemeClr val="accent1"/>
+          </a:fillRef>
+          <a:effectRef idx="0">
+            <a:schemeClr val="accent1"/>
+          </a:effectRef>
+          <a:fontRef idx="minor">
+            <a:schemeClr val="tx1"/>
+          </a:fontRef>
+        </p:style>
+      </p:cxnSp>
+      <p:cxnSp>
+        <p:nvCxnSpPr>
+          <p:cNvPr id="50" name="Straight Arrow Connector 49"/>
+          <p:cNvCxnSpPr/>
+          <p:nvPr/>
+        </p:nvCxnSpPr>
+        <p:spPr>
+          <a:xfrm>
+            <a:off x="6445726" y="1372394"/>
+            <a:ext cx="0" cy="4068286"/>
+          </a:xfrm>
+          <a:prstGeom prst="straightConnector1">
+            <a:avLst/>
+          </a:prstGeom>
+          <a:ln w="38100">
+            <a:solidFill>
+              <a:schemeClr val="tx1"/>
+            </a:solidFill>
+            <a:headEnd type="triangle" w="lg" len="med"/>
+            <a:tailEnd type="triangle" w="lg" len="med"/>
+          </a:ln>
+        </p:spPr>
+        <p:style>
+          <a:lnRef idx="1">
+            <a:schemeClr val="accent1"/>
+          </a:lnRef>
+          <a:fillRef idx="0">
+            <a:schemeClr val="accent1"/>
+          </a:fillRef>
+          <a:effectRef idx="0">
+            <a:schemeClr val="accent1"/>
+          </a:effectRef>
+          <a:fontRef idx="minor">
+            <a:schemeClr val="tx1"/>
+          </a:fontRef>
+        </p:style>
+      </p:cxnSp>
+      <p:sp>
+        <p:nvSpPr>
+          <p:cNvPr id="51" name="Rectangle 50"/>
+          <p:cNvSpPr/>
+          <p:nvPr/>
+        </p:nvSpPr>
+        <p:spPr>
+          <a:xfrm rot="16200000">
+            <a:off x="1721083" y="3276809"/>
+            <a:ext cx="1646605" cy="307777"/>
+          </a:xfrm>
+          <a:prstGeom prst="rect">
+            <a:avLst/>
+          </a:prstGeom>
+        </p:spPr>
+        <p:txBody>
+          <a:bodyPr wrap="none">
+            <a:spAutoFit/>
+          </a:bodyPr>
+          <a:lstStyle/>
+          <a:p>
+            <a:r>
+              <a:rPr lang="en-US" sz="1400" dirty="0" smtClean="0">
+                <a:latin typeface="Tahoma" pitchFamily="34" charset="0"/>
+                <a:ea typeface="Tahoma" pitchFamily="34" charset="0"/>
+                <a:cs typeface="Tahoma" pitchFamily="34" charset="0"/>
+              </a:rPr>
+              <a:t>VSUP - 3.6V ~ 5V</a:t>
+            </a:r>
+            <a:endParaRPr lang="en-US" sz="1400" dirty="0">
+              <a:latin typeface="Tahoma" pitchFamily="34" charset="0"/>
+              <a:ea typeface="Tahoma" pitchFamily="34" charset="0"/>
+              <a:cs typeface="Tahoma" pitchFamily="34" charset="0"/>
+            </a:endParaRPr>
+          </a:p>
+        </p:txBody>
+      </p:sp>
+      <p:sp>
+        <p:nvSpPr>
+          <p:cNvPr id="52" name="Rectangle 51"/>
+          <p:cNvSpPr/>
+          <p:nvPr/>
+        </p:nvSpPr>
+        <p:spPr>
+          <a:xfrm rot="16200000">
+            <a:off x="2058638" y="3276810"/>
+            <a:ext cx="1701428" cy="307777"/>
+          </a:xfrm>
+          <a:prstGeom prst="rect">
+            <a:avLst/>
+          </a:prstGeom>
+        </p:spPr>
+        <p:txBody>
+          <a:bodyPr wrap="none">
+            <a:spAutoFit/>
+          </a:bodyPr>
+          <a:lstStyle/>
+          <a:p>
+            <a:r>
+              <a:rPr lang="en-US" sz="1400" dirty="0" smtClean="0">
+                <a:latin typeface="Tahoma" pitchFamily="34" charset="0"/>
+                <a:ea typeface="Tahoma" pitchFamily="34" charset="0"/>
+                <a:cs typeface="Tahoma" pitchFamily="34" charset="0"/>
+              </a:rPr>
+              <a:t>D3V3 - Digital 3.3V</a:t>
+            </a:r>
+            <a:endParaRPr lang="en-US" sz="1400" dirty="0">
+              <a:latin typeface="Tahoma" pitchFamily="34" charset="0"/>
+              <a:ea typeface="Tahoma" pitchFamily="34" charset="0"/>
+              <a:cs typeface="Tahoma" pitchFamily="34" charset="0"/>
+            </a:endParaRPr>
+          </a:p>
+        </p:txBody>
+      </p:sp>
+      <p:cxnSp>
+        <p:nvCxnSpPr>
+          <p:cNvPr id="54" name="Straight Arrow Connector 53"/>
+          <p:cNvCxnSpPr/>
+          <p:nvPr/>
+        </p:nvCxnSpPr>
+        <p:spPr>
+          <a:xfrm>
+            <a:off x="3474720" y="1372394"/>
+            <a:ext cx="0" cy="4068286"/>
+          </a:xfrm>
+          <a:prstGeom prst="straightConnector1">
+            <a:avLst/>
+          </a:prstGeom>
+          <a:ln w="38100">
+            <a:solidFill>
+              <a:schemeClr val="tx1"/>
+            </a:solidFill>
+            <a:headEnd type="triangle" w="lg" len="med"/>
+            <a:tailEnd type="triangle" w="lg" len="med"/>
+          </a:ln>
+        </p:spPr>
+        <p:style>
+          <a:lnRef idx="1">
+            <a:schemeClr val="accent1"/>
+          </a:lnRef>
+          <a:fillRef idx="0">
+            <a:schemeClr val="accent1"/>
+          </a:fillRef>
+          <a:effectRef idx="0">
+            <a:schemeClr val="accent1"/>
+          </a:effectRef>
+          <a:fontRef idx="minor">
+            <a:schemeClr val="tx1"/>
+          </a:fontRef>
+        </p:style>
+      </p:cxnSp>
+      <p:sp>
+        <p:nvSpPr>
+          <p:cNvPr id="56" name="Rectangle 55"/>
+          <p:cNvSpPr/>
+          <p:nvPr/>
+        </p:nvSpPr>
+        <p:spPr>
+          <a:xfrm rot="16200000">
+            <a:off x="2470118" y="3276810"/>
+            <a:ext cx="1701428" cy="307777"/>
+          </a:xfrm>
+          <a:prstGeom prst="rect">
+            <a:avLst/>
+          </a:prstGeom>
+        </p:spPr>
+        <p:txBody>
+          <a:bodyPr wrap="none">
+            <a:spAutoFit/>
+          </a:bodyPr>
+          <a:lstStyle/>
+          <a:p>
+            <a:r>
+              <a:rPr lang="en-US" sz="1400" dirty="0" smtClean="0">
+                <a:latin typeface="Tahoma" pitchFamily="34" charset="0"/>
+                <a:ea typeface="Tahoma" pitchFamily="34" charset="0"/>
+                <a:cs typeface="Tahoma" pitchFamily="34" charset="0"/>
+              </a:rPr>
+              <a:t>D1V5 - Digital 1.5V</a:t>
+            </a:r>
+            <a:endParaRPr lang="en-US" sz="1400" dirty="0">
+              <a:latin typeface="Tahoma" pitchFamily="34" charset="0"/>
+              <a:ea typeface="Tahoma" pitchFamily="34" charset="0"/>
+              <a:cs typeface="Tahoma" pitchFamily="34" charset="0"/>
+            </a:endParaRPr>
+          </a:p>
+        </p:txBody>
+      </p:sp>
+      <p:sp>
+        <p:nvSpPr>
+          <p:cNvPr id="58" name="Rectangle 57"/>
+          <p:cNvSpPr/>
+          <p:nvPr/>
+        </p:nvSpPr>
+        <p:spPr>
+          <a:xfrm rot="16200000">
+            <a:off x="5028452" y="3276810"/>
+            <a:ext cx="1726755" cy="307777"/>
+          </a:xfrm>
+          <a:prstGeom prst="rect">
+            <a:avLst/>
+          </a:prstGeom>
+        </p:spPr>
+        <p:txBody>
+          <a:bodyPr wrap="none">
+            <a:spAutoFit/>
+          </a:bodyPr>
+          <a:lstStyle/>
+          <a:p>
+            <a:r>
+              <a:rPr lang="en-US" sz="1400" dirty="0" smtClean="0">
+                <a:latin typeface="Tahoma" pitchFamily="34" charset="0"/>
+                <a:ea typeface="Tahoma" pitchFamily="34" charset="0"/>
+                <a:cs typeface="Tahoma" pitchFamily="34" charset="0"/>
+              </a:rPr>
+              <a:t>A1V5 - Analog 1.5V</a:t>
+            </a:r>
+            <a:endParaRPr lang="en-US" sz="1400" dirty="0">
+              <a:latin typeface="Tahoma" pitchFamily="34" charset="0"/>
+              <a:ea typeface="Tahoma" pitchFamily="34" charset="0"/>
+              <a:cs typeface="Tahoma" pitchFamily="34" charset="0"/>
+            </a:endParaRPr>
+          </a:p>
+        </p:txBody>
+      </p:sp>
+      <p:sp>
+        <p:nvSpPr>
+          <p:cNvPr id="59" name="Rectangle 58"/>
+          <p:cNvSpPr/>
+          <p:nvPr/>
+        </p:nvSpPr>
+        <p:spPr>
+          <a:xfrm rot="16200000">
+            <a:off x="5423904" y="3276810"/>
+            <a:ext cx="1758815" cy="307777"/>
+          </a:xfrm>
+          <a:prstGeom prst="rect">
+            <a:avLst/>
+          </a:prstGeom>
+        </p:spPr>
+        <p:txBody>
+          <a:bodyPr wrap="none">
+            <a:spAutoFit/>
+          </a:bodyPr>
+          <a:lstStyle/>
+          <a:p>
+            <a:r>
+              <a:rPr lang="en-US" sz="1400" dirty="0" smtClean="0">
+                <a:latin typeface="Tahoma" pitchFamily="34" charset="0"/>
+                <a:ea typeface="Tahoma" pitchFamily="34" charset="0"/>
+                <a:cs typeface="Tahoma" pitchFamily="34" charset="0"/>
+              </a:rPr>
+              <a:t>A3V3 – Analog 3.3V</a:t>
+            </a:r>
+            <a:endParaRPr lang="en-US" sz="1400" dirty="0">
+              <a:latin typeface="Tahoma" pitchFamily="34" charset="0"/>
+              <a:ea typeface="Tahoma" pitchFamily="34" charset="0"/>
+              <a:cs typeface="Tahoma" pitchFamily="34" charset="0"/>
+            </a:endParaRPr>
+          </a:p>
+        </p:txBody>
+      </p:sp>
+      <p:cxnSp>
+        <p:nvCxnSpPr>
+          <p:cNvPr id="60" name="Straight Arrow Connector 59"/>
+          <p:cNvCxnSpPr>
+            <a:endCxn id="7" idx="1"/>
+          </p:cNvCxnSpPr>
+          <p:nvPr/>
+        </p:nvCxnSpPr>
+        <p:spPr>
+          <a:xfrm>
+            <a:off x="3174563" y="4755290"/>
+            <a:ext cx="781929" cy="1"/>
+          </a:xfrm>
+          <a:prstGeom prst="straightConnector1">
+            <a:avLst/>
+          </a:prstGeom>
+          <a:ln w="38100">
+            <a:solidFill>
+              <a:schemeClr val="tx1"/>
+            </a:solidFill>
+            <a:headEnd type="oval" w="med" len="med"/>
+            <a:tailEnd type="triangle" w="lg" len="med"/>
+          </a:ln>
+        </p:spPr>
+        <p:style>
+          <a:lnRef idx="1">
+            <a:schemeClr val="accent1"/>
+          </a:lnRef>
+          <a:fillRef idx="0">
+            <a:schemeClr val="accent1"/>
+          </a:fillRef>
+          <a:effectRef idx="0">
+            <a:schemeClr val="accent1"/>
+          </a:effectRef>
+          <a:fontRef idx="minor">
+            <a:schemeClr val="tx1"/>
+          </a:fontRef>
+        </p:style>
+      </p:cxnSp>
+      <p:cxnSp>
+        <p:nvCxnSpPr>
+          <p:cNvPr id="61" name="Straight Arrow Connector 60"/>
+          <p:cNvCxnSpPr/>
+          <p:nvPr/>
+        </p:nvCxnSpPr>
+        <p:spPr>
+          <a:xfrm flipV="1">
+            <a:off x="3474720" y="3703320"/>
+            <a:ext cx="481772" cy="1"/>
+          </a:xfrm>
+          <a:prstGeom prst="straightConnector1">
+            <a:avLst/>
+          </a:prstGeom>
+          <a:ln w="38100">
+            <a:solidFill>
+              <a:schemeClr val="tx1"/>
+            </a:solidFill>
+            <a:headEnd type="oval" w="med" len="med"/>
+            <a:tailEnd type="triangle" w="lg" len="med"/>
+          </a:ln>
+        </p:spPr>
+        <p:style>
+          <a:lnRef idx="1">
+            <a:schemeClr val="accent1"/>
+          </a:lnRef>
+          <a:fillRef idx="0">
+            <a:schemeClr val="accent1"/>
+          </a:fillRef>
+          <a:effectRef idx="0">
+            <a:schemeClr val="accent1"/>
+          </a:effectRef>
+          <a:fontRef idx="minor">
+            <a:schemeClr val="tx1"/>
+          </a:fontRef>
+        </p:style>
+      </p:cxnSp>
+      <p:cxnSp>
+        <p:nvCxnSpPr>
+          <p:cNvPr id="62" name="Straight Arrow Connector 61"/>
+          <p:cNvCxnSpPr>
+            <a:endCxn id="63" idx="3"/>
+          </p:cNvCxnSpPr>
+          <p:nvPr/>
+        </p:nvCxnSpPr>
+        <p:spPr>
+          <a:xfrm flipH="1">
+            <a:off x="5410154" y="1920240"/>
+            <a:ext cx="1035573" cy="1"/>
+          </a:xfrm>
+          <a:prstGeom prst="straightConnector1">
+            <a:avLst/>
+          </a:prstGeom>
+          <a:ln w="38100">
+            <a:solidFill>
+              <a:schemeClr val="tx1"/>
+            </a:solidFill>
+            <a:headEnd type="oval" w="med" len="med"/>
+            <a:tailEnd type="triangle" w="lg" len="med"/>
+          </a:ln>
+        </p:spPr>
+        <p:style>
+          <a:lnRef idx="1">
+            <a:schemeClr val="accent1"/>
+          </a:lnRef>
+          <a:fillRef idx="0">
+            <a:schemeClr val="accent1"/>
+          </a:fillRef>
+          <a:effectRef idx="0">
+            <a:schemeClr val="accent1"/>
+          </a:effectRef>
+          <a:fontRef idx="minor">
+            <a:schemeClr val="tx1"/>
+          </a:fontRef>
+        </p:style>
+      </p:cxnSp>
+      <p:sp>
+        <p:nvSpPr>
+          <p:cNvPr id="63" name="Rectangle 62"/>
+          <p:cNvSpPr/>
+          <p:nvPr/>
+        </p:nvSpPr>
+        <p:spPr>
+          <a:xfrm>
+            <a:off x="3956492" y="1599790"/>
+            <a:ext cx="1453662" cy="640901"/>
+          </a:xfrm>
+          <a:prstGeom prst="rect">
+            <a:avLst/>
+          </a:prstGeom>
+          <a:noFill/>
+          <a:ln w="38100" cap="sq">
+            <a:solidFill>
+              <a:schemeClr val="tx1"/>
+            </a:solidFill>
+            <a:miter lim="800000"/>
+          </a:ln>
+        </p:spPr>
+        <p:style>
+          <a:lnRef idx="2">
+            <a:schemeClr val="accent1">
+              <a:shade val="50000"/>
+            </a:schemeClr>
+          </a:lnRef>
+          <a:fillRef idx="1">
+            <a:schemeClr val="accent1"/>
+          </a:fillRef>
+          <a:effectRef idx="0">
+            <a:schemeClr val="accent1"/>
+          </a:effectRef>
+          <a:fontRef idx="minor">
+            <a:schemeClr val="lt1"/>
+          </a:fontRef>
+        </p:style>
+        <p:txBody>
+          <a:bodyPr rtlCol="0" anchor="ctr">
+            <a:noAutofit/>
+          </a:bodyPr>
+          <a:lstStyle/>
+          <a:p>
+            <a:pPr algn="ctr"/>
+            <a:r>
+              <a:rPr lang="en-US" dirty="0" smtClean="0">
+                <a:solidFill>
+                  <a:schemeClr val="tx1"/>
+                </a:solidFill>
+                <a:latin typeface="Tahoma" pitchFamily="34" charset="0"/>
+                <a:ea typeface="Tahoma" pitchFamily="34" charset="0"/>
+                <a:cs typeface="Tahoma" pitchFamily="34" charset="0"/>
+              </a:rPr>
+              <a:t>ADC, DAC</a:t>
+            </a:r>
+            <a:endParaRPr lang="en-US" dirty="0">
+              <a:solidFill>
+                <a:schemeClr val="tx1"/>
+              </a:solidFill>
+              <a:latin typeface="Tahoma" pitchFamily="34" charset="0"/>
+              <a:ea typeface="Tahoma" pitchFamily="34" charset="0"/>
+              <a:cs typeface="Tahoma" pitchFamily="34" charset="0"/>
+            </a:endParaRPr>
+          </a:p>
+        </p:txBody>
+      </p:sp>
+      <p:cxnSp>
+        <p:nvCxnSpPr>
+          <p:cNvPr id="65" name="Straight Arrow Connector 64"/>
+          <p:cNvCxnSpPr/>
+          <p:nvPr/>
+        </p:nvCxnSpPr>
+        <p:spPr>
+          <a:xfrm flipH="1">
+            <a:off x="5410154" y="3703320"/>
+            <a:ext cx="1035573" cy="0"/>
+          </a:xfrm>
+          <a:prstGeom prst="straightConnector1">
+            <a:avLst/>
+          </a:prstGeom>
+          <a:ln w="38100">
+            <a:solidFill>
+              <a:schemeClr val="tx1"/>
+            </a:solidFill>
+            <a:headEnd type="oval" w="med" len="med"/>
+            <a:tailEnd type="triangle" w="lg" len="med"/>
+          </a:ln>
+        </p:spPr>
+        <p:style>
+          <a:lnRef idx="1">
+            <a:schemeClr val="accent1"/>
+          </a:lnRef>
+          <a:fillRef idx="0">
+            <a:schemeClr val="accent1"/>
+          </a:fillRef>
+          <a:effectRef idx="0">
+            <a:schemeClr val="accent1"/>
+          </a:effectRef>
+          <a:fontRef idx="minor">
+            <a:schemeClr val="tx1"/>
+          </a:fontRef>
+        </p:style>
+      </p:cxnSp>
+      <p:cxnSp>
+        <p:nvCxnSpPr>
+          <p:cNvPr id="66" name="Straight Arrow Connector 65"/>
+          <p:cNvCxnSpPr/>
+          <p:nvPr/>
+        </p:nvCxnSpPr>
+        <p:spPr>
+          <a:xfrm flipH="1">
+            <a:off x="5410154" y="3017520"/>
+            <a:ext cx="670606" cy="0"/>
+          </a:xfrm>
+          <a:prstGeom prst="straightConnector1">
+            <a:avLst/>
+          </a:prstGeom>
+          <a:ln w="38100">
+            <a:solidFill>
+              <a:schemeClr val="tx1"/>
+            </a:solidFill>
+            <a:headEnd type="oval" w="med" len="med"/>
+            <a:tailEnd type="triangle" w="lg" len="med"/>
+          </a:ln>
+        </p:spPr>
+        <p:style>
+          <a:lnRef idx="1">
+            <a:schemeClr val="accent1"/>
+          </a:lnRef>
+          <a:fillRef idx="0">
+            <a:schemeClr val="accent1"/>
+          </a:fillRef>
+          <a:effectRef idx="0">
+            <a:schemeClr val="accent1"/>
+          </a:effectRef>
+          <a:fontRef idx="minor">
+            <a:schemeClr val="tx1"/>
+          </a:fontRef>
+        </p:style>
+      </p:cxnSp>
+      <p:cxnSp>
+        <p:nvCxnSpPr>
+          <p:cNvPr id="67" name="Straight Arrow Connector 66"/>
+          <p:cNvCxnSpPr/>
+          <p:nvPr/>
+        </p:nvCxnSpPr>
+        <p:spPr>
+          <a:xfrm>
+            <a:off x="3063241" y="3040381"/>
+            <a:ext cx="893251" cy="0"/>
+          </a:xfrm>
+          <a:prstGeom prst="straightConnector1">
+            <a:avLst/>
+          </a:prstGeom>
+          <a:ln w="38100">
+            <a:solidFill>
+              <a:schemeClr val="tx1"/>
+            </a:solidFill>
+            <a:headEnd type="oval" w="med" len="med"/>
+            <a:tailEnd type="triangle" w="lg" len="med"/>
+          </a:ln>
+        </p:spPr>
+        <p:style>
+          <a:lnRef idx="1">
+            <a:schemeClr val="accent1"/>
+          </a:lnRef>
+          <a:fillRef idx="0">
+            <a:schemeClr val="accent1"/>
+          </a:fillRef>
+          <a:effectRef idx="0">
+            <a:schemeClr val="accent1"/>
+          </a:effectRef>
+          <a:fontRef idx="minor">
+            <a:schemeClr val="tx1"/>
+          </a:fontRef>
+        </p:style>
+      </p:cxnSp>
+    </p:spTree>
+    <p:extLst>
+      <p:ext uri="{BB962C8B-B14F-4D97-AF65-F5344CB8AC3E}">
+        <p14:creationId xmlns:p14="http://schemas.microsoft.com/office/powerpoint/2010/main" val="305797960"/>
+      </p:ext>
+    </p:extLst>
+  </p:cSld>
+  <p:clrMapOvr>
+    <a:masterClrMapping/>
+  </p:clrMapOvr>
+</p:sld>
+</file>
+
+<file path=ppt/slides/slide5.xml><?xml version="1.0" encoding="utf-8"?>
+<p:sld xmlns:a="http://schemas.openxmlformats.org/drawingml/2006/main" xmlns:r="http://schemas.openxmlformats.org/officeDocument/2006/relationships" xmlns:p="http://schemas.openxmlformats.org/presentationml/2006/main">
+  <p:cSld>
+    <p:spTree>
+      <p:nvGrpSpPr>
+        <p:cNvPr id="1" name=""/>
+        <p:cNvGrpSpPr/>
+        <p:nvPr/>
+      </p:nvGrpSpPr>
+      <p:grpSpPr>
+        <a:xfrm>
+          <a:off x="0" y="0"/>
+          <a:ext cx="0" cy="0"/>
+          <a:chOff x="0" y="0"/>
+          <a:chExt cx="0" cy="0"/>
+        </a:xfrm>
+      </p:grpSpPr>
+      <p:grpSp>
+        <p:nvGrpSpPr>
+          <p:cNvPr id="4" name="Group 3"/>
+          <p:cNvGrpSpPr/>
+          <p:nvPr/>
+        </p:nvGrpSpPr>
+        <p:grpSpPr>
+          <a:xfrm>
+            <a:off x="3956492" y="2610934"/>
+            <a:ext cx="1453662" cy="1453662"/>
+            <a:chOff x="5181600" y="2683669"/>
+            <a:chExt cx="1188720" cy="1185862"/>
+          </a:xfrm>
+        </p:grpSpPr>
+        <p:pic>
+          <p:nvPicPr>
+            <p:cNvPr id="5" name="Picture 2"/>
+            <p:cNvPicPr>
+              <a:picLocks noChangeAspect="1" noChangeArrowheads="1"/>
+            </p:cNvPicPr>
+            <p:nvPr/>
+          </p:nvPicPr>
+          <p:blipFill>
+            <a:blip r:embed="rId2" cstate="print"/>
+            <a:srcRect/>
+            <a:stretch>
+              <a:fillRect/>
+            </a:stretch>
+          </p:blipFill>
+          <p:spPr bwMode="auto">
+            <a:xfrm>
+              <a:off x="5334000" y="2819400"/>
+              <a:ext cx="914400" cy="904097"/>
+            </a:xfrm>
+            <a:prstGeom prst="rect">
+              <a:avLst/>
+            </a:prstGeom>
+            <a:noFill/>
+            <a:ln w="9525">
+              <a:noFill/>
+              <a:miter lim="800000"/>
+              <a:headEnd/>
+              <a:tailEnd/>
+            </a:ln>
+          </p:spPr>
+        </p:pic>
+        <p:sp>
+          <p:nvSpPr>
+            <p:cNvPr id="6" name="Rectangle 5"/>
+            <p:cNvSpPr/>
+            <p:nvPr/>
+          </p:nvSpPr>
+          <p:spPr>
+            <a:xfrm>
+              <a:off x="5181600" y="2683669"/>
+              <a:ext cx="1188720" cy="1185862"/>
+            </a:xfrm>
+            <a:prstGeom prst="rect">
+              <a:avLst/>
+            </a:prstGeom>
+            <a:noFill/>
+            <a:ln w="38100" cap="sq">
+              <a:solidFill>
+                <a:schemeClr val="tx1"/>
+              </a:solidFill>
+              <a:miter lim="800000"/>
+            </a:ln>
+          </p:spPr>
+          <p:style>
+            <a:lnRef idx="2">
+              <a:schemeClr val="accent1">
+                <a:shade val="50000"/>
+              </a:schemeClr>
+            </a:lnRef>
+            <a:fillRef idx="1">
+              <a:schemeClr val="accent1"/>
+            </a:fillRef>
+            <a:effectRef idx="0">
+              <a:schemeClr val="accent1"/>
+            </a:effectRef>
+            <a:fontRef idx="minor">
+              <a:schemeClr val="lt1"/>
+            </a:fontRef>
+          </p:style>
+          <p:txBody>
+            <a:bodyPr rtlCol="0" anchor="ctr"/>
+            <a:lstStyle/>
+            <a:p>
+              <a:pPr algn="ctr"/>
+              <a:endParaRPr lang="en-US" sz="1400"/>
+            </a:p>
+          </p:txBody>
+        </p:sp>
+      </p:grpSp>
+      <p:sp>
+        <p:nvSpPr>
+          <p:cNvPr id="7" name="Rectangle 6"/>
+          <p:cNvSpPr/>
+          <p:nvPr/>
+        </p:nvSpPr>
+        <p:spPr>
+          <a:xfrm>
+            <a:off x="3956492" y="4434840"/>
+            <a:ext cx="1453662" cy="640901"/>
+          </a:xfrm>
+          <a:prstGeom prst="rect">
+            <a:avLst/>
+          </a:prstGeom>
+          <a:noFill/>
+          <a:ln w="38100" cap="sq">
+            <a:solidFill>
+              <a:schemeClr val="tx1"/>
+            </a:solidFill>
+            <a:miter lim="800000"/>
+          </a:ln>
+        </p:spPr>
+        <p:style>
+          <a:lnRef idx="2">
+            <a:schemeClr val="accent1">
+              <a:shade val="50000"/>
+            </a:schemeClr>
+          </a:lnRef>
+          <a:fillRef idx="1">
+            <a:schemeClr val="accent1"/>
+          </a:fillRef>
+          <a:effectRef idx="0">
+            <a:schemeClr val="accent1"/>
+          </a:effectRef>
+          <a:fontRef idx="minor">
+            <a:schemeClr val="lt1"/>
+          </a:fontRef>
+        </p:style>
+        <p:txBody>
+          <a:bodyPr rtlCol="0" anchor="ctr">
+            <a:noAutofit/>
+          </a:bodyPr>
+          <a:lstStyle/>
+          <a:p>
+            <a:pPr algn="ctr"/>
+            <a:r>
+              <a:rPr lang="en-US" dirty="0" smtClean="0">
+                <a:solidFill>
+                  <a:schemeClr val="tx1"/>
+                </a:solidFill>
+                <a:latin typeface="Tahoma" pitchFamily="34" charset="0"/>
+                <a:ea typeface="Tahoma" pitchFamily="34" charset="0"/>
+                <a:cs typeface="Tahoma" pitchFamily="34" charset="0"/>
+              </a:rPr>
+              <a:t>SRAM</a:t>
+            </a:r>
+            <a:endParaRPr lang="en-US" dirty="0">
+              <a:solidFill>
+                <a:schemeClr val="tx1"/>
+              </a:solidFill>
+              <a:latin typeface="Tahoma" pitchFamily="34" charset="0"/>
+              <a:ea typeface="Tahoma" pitchFamily="34" charset="0"/>
+              <a:cs typeface="Tahoma" pitchFamily="34" charset="0"/>
+            </a:endParaRPr>
+          </a:p>
+        </p:txBody>
+      </p:sp>
+      <p:sp>
+        <p:nvSpPr>
+          <p:cNvPr id="13" name="Rectangle 12"/>
+          <p:cNvSpPr/>
+          <p:nvPr/>
+        </p:nvSpPr>
+        <p:spPr>
+          <a:xfrm>
+            <a:off x="2286000" y="5440680"/>
+            <a:ext cx="4572000" cy="548640"/>
+          </a:xfrm>
+          <a:prstGeom prst="rect">
+            <a:avLst/>
+          </a:prstGeom>
+          <a:noFill/>
+          <a:ln w="38100" cap="sq">
+            <a:solidFill>
+              <a:schemeClr val="tx1"/>
+            </a:solidFill>
+            <a:miter lim="800000"/>
+          </a:ln>
+        </p:spPr>
+        <p:style>
+          <a:lnRef idx="2">
+            <a:schemeClr val="accent1">
+              <a:shade val="50000"/>
+            </a:schemeClr>
+          </a:lnRef>
+          <a:fillRef idx="1">
+            <a:schemeClr val="accent1"/>
+          </a:fillRef>
+          <a:effectRef idx="0">
+            <a:schemeClr val="accent1"/>
+          </a:effectRef>
+          <a:fontRef idx="minor">
+            <a:schemeClr val="lt1"/>
+          </a:fontRef>
+        </p:style>
+        <p:txBody>
+          <a:bodyPr rtlCol="0" anchor="ctr">
+            <a:noAutofit/>
+          </a:bodyPr>
+          <a:lstStyle/>
+          <a:p>
+            <a:pPr algn="ctr"/>
+            <a:r>
+              <a:rPr lang="en-US" dirty="0" smtClean="0">
+                <a:solidFill>
+                  <a:schemeClr val="tx1"/>
+                </a:solidFill>
+                <a:latin typeface="Tahoma" pitchFamily="34" charset="0"/>
+                <a:ea typeface="Tahoma" pitchFamily="34" charset="0"/>
+                <a:cs typeface="Tahoma" pitchFamily="34" charset="0"/>
+              </a:rPr>
+              <a:t>South Bridge</a:t>
+            </a:r>
+            <a:endParaRPr lang="en-US" dirty="0">
+              <a:solidFill>
+                <a:schemeClr val="tx1"/>
+              </a:solidFill>
+              <a:latin typeface="Tahoma" pitchFamily="34" charset="0"/>
+              <a:ea typeface="Tahoma" pitchFamily="34" charset="0"/>
+              <a:cs typeface="Tahoma" pitchFamily="34" charset="0"/>
+            </a:endParaRPr>
+          </a:p>
+        </p:txBody>
+      </p:sp>
+      <p:sp>
+        <p:nvSpPr>
+          <p:cNvPr id="14" name="Rectangle 13"/>
+          <p:cNvSpPr/>
+          <p:nvPr/>
+        </p:nvSpPr>
+        <p:spPr>
+          <a:xfrm>
+            <a:off x="2286000" y="822960"/>
+            <a:ext cx="4572000" cy="548640"/>
+          </a:xfrm>
+          <a:prstGeom prst="rect">
+            <a:avLst/>
+          </a:prstGeom>
+          <a:noFill/>
+          <a:ln w="38100" cap="sq">
+            <a:solidFill>
+              <a:schemeClr val="tx1"/>
+            </a:solidFill>
+            <a:miter lim="800000"/>
+          </a:ln>
+        </p:spPr>
+        <p:style>
+          <a:lnRef idx="2">
+            <a:schemeClr val="accent1">
+              <a:shade val="50000"/>
+            </a:schemeClr>
+          </a:lnRef>
+          <a:fillRef idx="1">
+            <a:schemeClr val="accent1"/>
+          </a:fillRef>
+          <a:effectRef idx="0">
+            <a:schemeClr val="accent1"/>
+          </a:effectRef>
+          <a:fontRef idx="minor">
+            <a:schemeClr val="lt1"/>
+          </a:fontRef>
+        </p:style>
+        <p:txBody>
+          <a:bodyPr rtlCol="0" anchor="ctr">
+            <a:noAutofit/>
+          </a:bodyPr>
+          <a:lstStyle/>
+          <a:p>
+            <a:pPr algn="ctr"/>
+            <a:r>
+              <a:rPr lang="en-US" dirty="0" smtClean="0">
+                <a:solidFill>
+                  <a:schemeClr val="tx1"/>
+                </a:solidFill>
+                <a:latin typeface="Tahoma" pitchFamily="34" charset="0"/>
+                <a:ea typeface="Tahoma" pitchFamily="34" charset="0"/>
+                <a:cs typeface="Tahoma" pitchFamily="34" charset="0"/>
+              </a:rPr>
+              <a:t>North Bridge</a:t>
+            </a:r>
+            <a:endParaRPr lang="en-US" dirty="0">
+              <a:solidFill>
+                <a:schemeClr val="tx1"/>
+              </a:solidFill>
+              <a:latin typeface="Tahoma" pitchFamily="34" charset="0"/>
+              <a:ea typeface="Tahoma" pitchFamily="34" charset="0"/>
+              <a:cs typeface="Tahoma" pitchFamily="34" charset="0"/>
+            </a:endParaRPr>
+          </a:p>
+        </p:txBody>
+      </p:sp>
+      <p:cxnSp>
+        <p:nvCxnSpPr>
+          <p:cNvPr id="40" name="Straight Arrow Connector 39"/>
+          <p:cNvCxnSpPr/>
+          <p:nvPr/>
+        </p:nvCxnSpPr>
+        <p:spPr>
+          <a:xfrm>
+            <a:off x="2698274" y="1372394"/>
+            <a:ext cx="0" cy="4068286"/>
+          </a:xfrm>
+          <a:prstGeom prst="straightConnector1">
+            <a:avLst/>
+          </a:prstGeom>
+          <a:ln w="38100">
+            <a:solidFill>
+              <a:schemeClr val="tx1"/>
+            </a:solidFill>
+            <a:headEnd type="triangle" w="lg" len="med"/>
+            <a:tailEnd type="triangle" w="lg" len="med"/>
+          </a:ln>
+        </p:spPr>
+        <p:style>
+          <a:lnRef idx="1">
+            <a:schemeClr val="accent1"/>
+          </a:lnRef>
+          <a:fillRef idx="0">
+            <a:schemeClr val="accent1"/>
+          </a:fillRef>
+          <a:effectRef idx="0">
+            <a:schemeClr val="accent1"/>
+          </a:effectRef>
+          <a:fontRef idx="minor">
+            <a:schemeClr val="tx1"/>
+          </a:fontRef>
+        </p:style>
+      </p:cxnSp>
+      <p:cxnSp>
+        <p:nvCxnSpPr>
+          <p:cNvPr id="45" name="Straight Arrow Connector 44"/>
+          <p:cNvCxnSpPr/>
+          <p:nvPr/>
+        </p:nvCxnSpPr>
+        <p:spPr>
+          <a:xfrm>
+            <a:off x="3086497" y="1372394"/>
+            <a:ext cx="0" cy="4068286"/>
+          </a:xfrm>
+          <a:prstGeom prst="straightConnector1">
+            <a:avLst/>
+          </a:prstGeom>
+          <a:ln w="38100">
+            <a:solidFill>
+              <a:schemeClr val="tx1"/>
+            </a:solidFill>
+            <a:headEnd type="triangle" w="lg" len="med"/>
+            <a:tailEnd type="triangle" w="lg" len="med"/>
+          </a:ln>
+        </p:spPr>
+        <p:style>
+          <a:lnRef idx="1">
+            <a:schemeClr val="accent1"/>
+          </a:lnRef>
+          <a:fillRef idx="0">
+            <a:schemeClr val="accent1"/>
+          </a:fillRef>
+          <a:effectRef idx="0">
+            <a:schemeClr val="accent1"/>
+          </a:effectRef>
+          <a:fontRef idx="minor">
+            <a:schemeClr val="tx1"/>
+          </a:fontRef>
+        </p:style>
+      </p:cxnSp>
+      <p:cxnSp>
+        <p:nvCxnSpPr>
+          <p:cNvPr id="47" name="Straight Arrow Connector 46"/>
+          <p:cNvCxnSpPr/>
+          <p:nvPr/>
+        </p:nvCxnSpPr>
+        <p:spPr>
+          <a:xfrm>
+            <a:off x="6080760" y="1372394"/>
+            <a:ext cx="0" cy="4068286"/>
+          </a:xfrm>
+          <a:prstGeom prst="straightConnector1">
+            <a:avLst/>
+          </a:prstGeom>
+          <a:ln w="38100">
+            <a:solidFill>
+              <a:schemeClr val="tx1"/>
+            </a:solidFill>
+            <a:headEnd type="triangle" w="lg" len="med"/>
+            <a:tailEnd type="triangle" w="lg" len="med"/>
+          </a:ln>
+        </p:spPr>
+        <p:style>
+          <a:lnRef idx="1">
+            <a:schemeClr val="accent1"/>
+          </a:lnRef>
+          <a:fillRef idx="0">
+            <a:schemeClr val="accent1"/>
+          </a:fillRef>
+          <a:effectRef idx="0">
+            <a:schemeClr val="accent1"/>
+          </a:effectRef>
+          <a:fontRef idx="minor">
+            <a:schemeClr val="tx1"/>
+          </a:fontRef>
+        </p:style>
+      </p:cxnSp>
+      <p:cxnSp>
+        <p:nvCxnSpPr>
+          <p:cNvPr id="50" name="Straight Arrow Connector 49"/>
+          <p:cNvCxnSpPr/>
+          <p:nvPr/>
+        </p:nvCxnSpPr>
+        <p:spPr>
+          <a:xfrm>
+            <a:off x="6445726" y="1372394"/>
+            <a:ext cx="0" cy="4068286"/>
+          </a:xfrm>
+          <a:prstGeom prst="straightConnector1">
+            <a:avLst/>
+          </a:prstGeom>
+          <a:ln w="38100">
+            <a:solidFill>
+              <a:schemeClr val="tx1"/>
+            </a:solidFill>
+            <a:headEnd type="triangle" w="lg" len="med"/>
+            <a:tailEnd type="triangle" w="lg" len="med"/>
+          </a:ln>
+        </p:spPr>
+        <p:style>
+          <a:lnRef idx="1">
+            <a:schemeClr val="accent1"/>
+          </a:lnRef>
+          <a:fillRef idx="0">
+            <a:schemeClr val="accent1"/>
+          </a:fillRef>
+          <a:effectRef idx="0">
+            <a:schemeClr val="accent1"/>
+          </a:effectRef>
+          <a:fontRef idx="minor">
+            <a:schemeClr val="tx1"/>
+          </a:fontRef>
+        </p:style>
+      </p:cxnSp>
+      <p:sp>
+        <p:nvSpPr>
+          <p:cNvPr id="51" name="Rectangle 50"/>
+          <p:cNvSpPr/>
+          <p:nvPr/>
+        </p:nvSpPr>
+        <p:spPr>
+          <a:xfrm rot="16200000">
+            <a:off x="2255695" y="1842481"/>
+            <a:ext cx="607859" cy="307777"/>
+          </a:xfrm>
+          <a:prstGeom prst="rect">
+            <a:avLst/>
+          </a:prstGeom>
+        </p:spPr>
+        <p:txBody>
+          <a:bodyPr wrap="none">
+            <a:spAutoFit/>
+          </a:bodyPr>
+          <a:lstStyle/>
+          <a:p>
+            <a:r>
+              <a:rPr lang="en-US" sz="1400" dirty="0" smtClean="0">
+                <a:latin typeface="Tahoma" pitchFamily="34" charset="0"/>
+                <a:ea typeface="Tahoma" pitchFamily="34" charset="0"/>
+                <a:cs typeface="Tahoma" pitchFamily="34" charset="0"/>
+              </a:rPr>
+              <a:t>VSUP</a:t>
+            </a:r>
+            <a:endParaRPr lang="en-US" sz="1400" dirty="0">
+              <a:latin typeface="Tahoma" pitchFamily="34" charset="0"/>
+              <a:ea typeface="Tahoma" pitchFamily="34" charset="0"/>
+              <a:cs typeface="Tahoma" pitchFamily="34" charset="0"/>
+            </a:endParaRPr>
+          </a:p>
+        </p:txBody>
+      </p:sp>
+      <p:sp>
+        <p:nvSpPr>
+          <p:cNvPr id="52" name="Rectangle 51"/>
+          <p:cNvSpPr/>
+          <p:nvPr/>
+        </p:nvSpPr>
+        <p:spPr>
+          <a:xfrm rot="16200000">
+            <a:off x="2642721" y="1842482"/>
+            <a:ext cx="609462" cy="307777"/>
+          </a:xfrm>
+          <a:prstGeom prst="rect">
+            <a:avLst/>
+          </a:prstGeom>
+        </p:spPr>
+        <p:txBody>
+          <a:bodyPr wrap="none">
+            <a:spAutoFit/>
+          </a:bodyPr>
+          <a:lstStyle/>
+          <a:p>
+            <a:r>
+              <a:rPr lang="en-US" sz="1400" dirty="0" smtClean="0">
+                <a:latin typeface="Tahoma" pitchFamily="34" charset="0"/>
+                <a:ea typeface="Tahoma" pitchFamily="34" charset="0"/>
+                <a:cs typeface="Tahoma" pitchFamily="34" charset="0"/>
+              </a:rPr>
+              <a:t>D3V3</a:t>
+            </a:r>
+            <a:endParaRPr lang="en-US" sz="1400" dirty="0">
+              <a:latin typeface="Tahoma" pitchFamily="34" charset="0"/>
+              <a:ea typeface="Tahoma" pitchFamily="34" charset="0"/>
+              <a:cs typeface="Tahoma" pitchFamily="34" charset="0"/>
+            </a:endParaRPr>
+          </a:p>
+        </p:txBody>
+      </p:sp>
+      <p:cxnSp>
+        <p:nvCxnSpPr>
+          <p:cNvPr id="54" name="Straight Arrow Connector 53"/>
+          <p:cNvCxnSpPr/>
+          <p:nvPr/>
+        </p:nvCxnSpPr>
+        <p:spPr>
+          <a:xfrm>
+            <a:off x="3474720" y="1372394"/>
+            <a:ext cx="0" cy="4068286"/>
+          </a:xfrm>
+          <a:prstGeom prst="straightConnector1">
+            <a:avLst/>
+          </a:prstGeom>
+          <a:ln w="38100">
+            <a:solidFill>
+              <a:schemeClr val="tx1"/>
+            </a:solidFill>
+            <a:headEnd type="triangle" w="lg" len="med"/>
+            <a:tailEnd type="triangle" w="lg" len="med"/>
+          </a:ln>
+        </p:spPr>
+        <p:style>
+          <a:lnRef idx="1">
+            <a:schemeClr val="accent1"/>
+          </a:lnRef>
+          <a:fillRef idx="0">
+            <a:schemeClr val="accent1"/>
+          </a:fillRef>
+          <a:effectRef idx="0">
+            <a:schemeClr val="accent1"/>
+          </a:effectRef>
+          <a:fontRef idx="minor">
+            <a:schemeClr val="tx1"/>
+          </a:fontRef>
+        </p:style>
+      </p:cxnSp>
+      <p:sp>
+        <p:nvSpPr>
+          <p:cNvPr id="56" name="Rectangle 55"/>
+          <p:cNvSpPr/>
+          <p:nvPr/>
+        </p:nvSpPr>
+        <p:spPr>
+          <a:xfrm rot="16200000">
+            <a:off x="3031340" y="1842482"/>
+            <a:ext cx="609462" cy="307777"/>
+          </a:xfrm>
+          <a:prstGeom prst="rect">
+            <a:avLst/>
+          </a:prstGeom>
+        </p:spPr>
+        <p:txBody>
+          <a:bodyPr wrap="none">
+            <a:spAutoFit/>
+          </a:bodyPr>
+          <a:lstStyle/>
+          <a:p>
+            <a:r>
+              <a:rPr lang="en-US" sz="1400" dirty="0" smtClean="0">
+                <a:latin typeface="Tahoma" pitchFamily="34" charset="0"/>
+                <a:ea typeface="Tahoma" pitchFamily="34" charset="0"/>
+                <a:cs typeface="Tahoma" pitchFamily="34" charset="0"/>
+              </a:rPr>
+              <a:t>D1V5</a:t>
+            </a:r>
+            <a:endParaRPr lang="en-US" sz="1400" dirty="0">
+              <a:latin typeface="Tahoma" pitchFamily="34" charset="0"/>
+              <a:ea typeface="Tahoma" pitchFamily="34" charset="0"/>
+              <a:cs typeface="Tahoma" pitchFamily="34" charset="0"/>
+            </a:endParaRPr>
+          </a:p>
+        </p:txBody>
+      </p:sp>
+      <p:sp>
+        <p:nvSpPr>
+          <p:cNvPr id="58" name="Rectangle 57"/>
+          <p:cNvSpPr/>
+          <p:nvPr/>
+        </p:nvSpPr>
+        <p:spPr>
+          <a:xfrm rot="16200000">
+            <a:off x="5629354" y="4624335"/>
+            <a:ext cx="595035" cy="307777"/>
+          </a:xfrm>
+          <a:prstGeom prst="rect">
+            <a:avLst/>
+          </a:prstGeom>
+        </p:spPr>
+        <p:txBody>
+          <a:bodyPr wrap="none">
+            <a:spAutoFit/>
+          </a:bodyPr>
+          <a:lstStyle/>
+          <a:p>
+            <a:r>
+              <a:rPr lang="en-US" sz="1400" dirty="0" smtClean="0">
+                <a:latin typeface="Tahoma" pitchFamily="34" charset="0"/>
+                <a:ea typeface="Tahoma" pitchFamily="34" charset="0"/>
+                <a:cs typeface="Tahoma" pitchFamily="34" charset="0"/>
+              </a:rPr>
+              <a:t>A1V5</a:t>
+            </a:r>
+            <a:endParaRPr lang="en-US" sz="1400" dirty="0">
+              <a:latin typeface="Tahoma" pitchFamily="34" charset="0"/>
+              <a:ea typeface="Tahoma" pitchFamily="34" charset="0"/>
+              <a:cs typeface="Tahoma" pitchFamily="34" charset="0"/>
+            </a:endParaRPr>
+          </a:p>
+        </p:txBody>
+      </p:sp>
+      <p:sp>
+        <p:nvSpPr>
+          <p:cNvPr id="59" name="Rectangle 58"/>
+          <p:cNvSpPr/>
+          <p:nvPr/>
+        </p:nvSpPr>
+        <p:spPr>
+          <a:xfrm rot="16200000">
+            <a:off x="5994321" y="4624335"/>
+            <a:ext cx="595035" cy="307777"/>
+          </a:xfrm>
+          <a:prstGeom prst="rect">
+            <a:avLst/>
+          </a:prstGeom>
+        </p:spPr>
+        <p:txBody>
+          <a:bodyPr wrap="none">
+            <a:spAutoFit/>
+          </a:bodyPr>
+          <a:lstStyle/>
+          <a:p>
+            <a:r>
+              <a:rPr lang="en-US" sz="1400" dirty="0" smtClean="0">
+                <a:latin typeface="Tahoma" pitchFamily="34" charset="0"/>
+                <a:ea typeface="Tahoma" pitchFamily="34" charset="0"/>
+                <a:cs typeface="Tahoma" pitchFamily="34" charset="0"/>
+              </a:rPr>
+              <a:t>A3V3</a:t>
+            </a:r>
+            <a:endParaRPr lang="en-US" sz="1400" dirty="0">
+              <a:latin typeface="Tahoma" pitchFamily="34" charset="0"/>
+              <a:ea typeface="Tahoma" pitchFamily="34" charset="0"/>
+              <a:cs typeface="Tahoma" pitchFamily="34" charset="0"/>
+            </a:endParaRPr>
+          </a:p>
+        </p:txBody>
+      </p:sp>
+      <p:cxnSp>
+        <p:nvCxnSpPr>
+          <p:cNvPr id="60" name="Straight Arrow Connector 59"/>
+          <p:cNvCxnSpPr>
+            <a:endCxn id="7" idx="1"/>
+          </p:cNvCxnSpPr>
+          <p:nvPr/>
+        </p:nvCxnSpPr>
+        <p:spPr>
+          <a:xfrm>
+            <a:off x="3078480" y="4755291"/>
+            <a:ext cx="878012" cy="0"/>
+          </a:xfrm>
+          <a:prstGeom prst="straightConnector1">
+            <a:avLst/>
+          </a:prstGeom>
+          <a:ln w="38100">
+            <a:solidFill>
+              <a:schemeClr val="tx1"/>
+            </a:solidFill>
+            <a:headEnd type="oval" w="med" len="med"/>
+            <a:tailEnd type="triangle" w="lg" len="med"/>
+          </a:ln>
+        </p:spPr>
+        <p:style>
+          <a:lnRef idx="1">
+            <a:schemeClr val="accent1"/>
+          </a:lnRef>
+          <a:fillRef idx="0">
+            <a:schemeClr val="accent1"/>
+          </a:fillRef>
+          <a:effectRef idx="0">
+            <a:schemeClr val="accent1"/>
+          </a:effectRef>
+          <a:fontRef idx="minor">
+            <a:schemeClr val="tx1"/>
+          </a:fontRef>
+        </p:style>
+      </p:cxnSp>
+      <p:cxnSp>
+        <p:nvCxnSpPr>
+          <p:cNvPr id="61" name="Straight Arrow Connector 60"/>
+          <p:cNvCxnSpPr/>
+          <p:nvPr/>
+        </p:nvCxnSpPr>
+        <p:spPr>
+          <a:xfrm flipV="1">
+            <a:off x="3474720" y="3703320"/>
+            <a:ext cx="481772" cy="1"/>
+          </a:xfrm>
+          <a:prstGeom prst="straightConnector1">
+            <a:avLst/>
+          </a:prstGeom>
+          <a:ln w="38100">
+            <a:solidFill>
+              <a:schemeClr val="tx1"/>
+            </a:solidFill>
+            <a:headEnd type="oval" w="med" len="med"/>
+            <a:tailEnd type="triangle" w="lg" len="med"/>
+          </a:ln>
+        </p:spPr>
+        <p:style>
+          <a:lnRef idx="1">
+            <a:schemeClr val="accent1"/>
+          </a:lnRef>
+          <a:fillRef idx="0">
+            <a:schemeClr val="accent1"/>
+          </a:fillRef>
+          <a:effectRef idx="0">
+            <a:schemeClr val="accent1"/>
+          </a:effectRef>
+          <a:fontRef idx="minor">
+            <a:schemeClr val="tx1"/>
+          </a:fontRef>
+        </p:style>
+      </p:cxnSp>
+      <p:cxnSp>
+        <p:nvCxnSpPr>
+          <p:cNvPr id="62" name="Straight Arrow Connector 61"/>
+          <p:cNvCxnSpPr>
+            <a:endCxn id="63" idx="3"/>
+          </p:cNvCxnSpPr>
+          <p:nvPr/>
+        </p:nvCxnSpPr>
+        <p:spPr>
+          <a:xfrm flipH="1">
+            <a:off x="5410154" y="1920240"/>
+            <a:ext cx="1035573" cy="1"/>
+          </a:xfrm>
+          <a:prstGeom prst="straightConnector1">
+            <a:avLst/>
+          </a:prstGeom>
+          <a:ln w="38100">
+            <a:solidFill>
+              <a:schemeClr val="tx1"/>
+            </a:solidFill>
+            <a:headEnd type="oval" w="med" len="med"/>
+            <a:tailEnd type="triangle" w="lg" len="med"/>
+          </a:ln>
+        </p:spPr>
+        <p:style>
+          <a:lnRef idx="1">
+            <a:schemeClr val="accent1"/>
+          </a:lnRef>
+          <a:fillRef idx="0">
+            <a:schemeClr val="accent1"/>
+          </a:fillRef>
+          <a:effectRef idx="0">
+            <a:schemeClr val="accent1"/>
+          </a:effectRef>
+          <a:fontRef idx="minor">
+            <a:schemeClr val="tx1"/>
+          </a:fontRef>
+        </p:style>
+      </p:cxnSp>
+      <p:sp>
+        <p:nvSpPr>
+          <p:cNvPr id="63" name="Rectangle 62"/>
+          <p:cNvSpPr/>
+          <p:nvPr/>
+        </p:nvSpPr>
+        <p:spPr>
+          <a:xfrm>
+            <a:off x="3956492" y="1599790"/>
+            <a:ext cx="1453662" cy="640901"/>
+          </a:xfrm>
+          <a:prstGeom prst="rect">
+            <a:avLst/>
+          </a:prstGeom>
+          <a:noFill/>
+          <a:ln w="38100" cap="sq">
+            <a:solidFill>
+              <a:schemeClr val="tx1"/>
+            </a:solidFill>
+            <a:miter lim="800000"/>
+          </a:ln>
+        </p:spPr>
+        <p:style>
+          <a:lnRef idx="2">
+            <a:schemeClr val="accent1">
+              <a:shade val="50000"/>
+            </a:schemeClr>
+          </a:lnRef>
+          <a:fillRef idx="1">
+            <a:schemeClr val="accent1"/>
+          </a:fillRef>
+          <a:effectRef idx="0">
+            <a:schemeClr val="accent1"/>
+          </a:effectRef>
+          <a:fontRef idx="minor">
+            <a:schemeClr val="lt1"/>
+          </a:fontRef>
+        </p:style>
+        <p:txBody>
+          <a:bodyPr rtlCol="0" anchor="ctr">
+            <a:noAutofit/>
+          </a:bodyPr>
+          <a:lstStyle/>
+          <a:p>
+            <a:pPr algn="ctr"/>
+            <a:r>
+              <a:rPr lang="en-US" dirty="0" smtClean="0">
+                <a:solidFill>
+                  <a:schemeClr val="tx1"/>
+                </a:solidFill>
+                <a:latin typeface="Tahoma" pitchFamily="34" charset="0"/>
+                <a:ea typeface="Tahoma" pitchFamily="34" charset="0"/>
+                <a:cs typeface="Tahoma" pitchFamily="34" charset="0"/>
+              </a:rPr>
+              <a:t>ADC, DAC</a:t>
+            </a:r>
+            <a:endParaRPr lang="en-US" dirty="0">
+              <a:solidFill>
+                <a:schemeClr val="tx1"/>
+              </a:solidFill>
+              <a:latin typeface="Tahoma" pitchFamily="34" charset="0"/>
+              <a:ea typeface="Tahoma" pitchFamily="34" charset="0"/>
+              <a:cs typeface="Tahoma" pitchFamily="34" charset="0"/>
+            </a:endParaRPr>
+          </a:p>
+        </p:txBody>
+      </p:sp>
+      <p:cxnSp>
+        <p:nvCxnSpPr>
+          <p:cNvPr id="65" name="Straight Arrow Connector 64"/>
+          <p:cNvCxnSpPr/>
+          <p:nvPr/>
+        </p:nvCxnSpPr>
+        <p:spPr>
+          <a:xfrm flipH="1">
+            <a:off x="5410154" y="3703320"/>
+            <a:ext cx="1035573" cy="0"/>
+          </a:xfrm>
+          <a:prstGeom prst="straightConnector1">
+            <a:avLst/>
+          </a:prstGeom>
+          <a:ln w="38100">
+            <a:solidFill>
+              <a:schemeClr val="tx1"/>
+            </a:solidFill>
+            <a:headEnd type="oval" w="med" len="med"/>
+            <a:tailEnd type="triangle" w="lg" len="med"/>
+          </a:ln>
+        </p:spPr>
+        <p:style>
+          <a:lnRef idx="1">
+            <a:schemeClr val="accent1"/>
+          </a:lnRef>
+          <a:fillRef idx="0">
+            <a:schemeClr val="accent1"/>
+          </a:fillRef>
+          <a:effectRef idx="0">
+            <a:schemeClr val="accent1"/>
+          </a:effectRef>
+          <a:fontRef idx="minor">
+            <a:schemeClr val="tx1"/>
+          </a:fontRef>
+        </p:style>
+      </p:cxnSp>
+      <p:cxnSp>
+        <p:nvCxnSpPr>
+          <p:cNvPr id="66" name="Straight Arrow Connector 65"/>
+          <p:cNvCxnSpPr/>
+          <p:nvPr/>
+        </p:nvCxnSpPr>
+        <p:spPr>
+          <a:xfrm flipH="1">
+            <a:off x="5410154" y="3017520"/>
+            <a:ext cx="670606" cy="0"/>
+          </a:xfrm>
+          <a:prstGeom prst="straightConnector1">
+            <a:avLst/>
+          </a:prstGeom>
+          <a:ln w="38100">
+            <a:solidFill>
+              <a:schemeClr val="tx1"/>
+            </a:solidFill>
+            <a:headEnd type="oval" w="med" len="med"/>
+            <a:tailEnd type="triangle" w="lg" len="med"/>
+          </a:ln>
+        </p:spPr>
+        <p:style>
+          <a:lnRef idx="1">
+            <a:schemeClr val="accent1"/>
+          </a:lnRef>
+          <a:fillRef idx="0">
+            <a:schemeClr val="accent1"/>
+          </a:fillRef>
+          <a:effectRef idx="0">
+            <a:schemeClr val="accent1"/>
+          </a:effectRef>
+          <a:fontRef idx="minor">
+            <a:schemeClr val="tx1"/>
+          </a:fontRef>
+        </p:style>
+      </p:cxnSp>
+      <p:cxnSp>
+        <p:nvCxnSpPr>
+          <p:cNvPr id="67" name="Straight Arrow Connector 66"/>
+          <p:cNvCxnSpPr/>
+          <p:nvPr/>
+        </p:nvCxnSpPr>
+        <p:spPr>
+          <a:xfrm>
+            <a:off x="3086497" y="3040381"/>
+            <a:ext cx="869995" cy="0"/>
+          </a:xfrm>
+          <a:prstGeom prst="straightConnector1">
+            <a:avLst/>
+          </a:prstGeom>
+          <a:ln w="38100">
+            <a:solidFill>
+              <a:schemeClr val="tx1"/>
+            </a:solidFill>
+            <a:headEnd type="oval" w="med" len="med"/>
+            <a:tailEnd type="triangle" w="lg" len="med"/>
+          </a:ln>
+        </p:spPr>
+        <p:style>
+          <a:lnRef idx="1">
+            <a:schemeClr val="accent1"/>
+          </a:lnRef>
+          <a:fillRef idx="0">
+            <a:schemeClr val="accent1"/>
+          </a:fillRef>
+          <a:effectRef idx="0">
+            <a:schemeClr val="accent1"/>
+          </a:effectRef>
+          <a:fontRef idx="minor">
+            <a:schemeClr val="tx1"/>
+          </a:fontRef>
+        </p:style>
+      </p:cxnSp>
+    </p:spTree>
+    <p:extLst>
+      <p:ext uri="{BB962C8B-B14F-4D97-AF65-F5344CB8AC3E}">
+        <p14:creationId xmlns:p14="http://schemas.microsoft.com/office/powerpoint/2010/main" val="2559094461"/>
+      </p:ext>
+    </p:extLst>
   </p:cSld>
   <p:clrMapOvr>
     <a:masterClrMapping/>

</xml_diff>

<commit_message>
USB routing optimization back-up.
</commit_message>
<xml_diff>
--- a/hardware/MainBoard/Misc/BlockDiagram.pptx
+++ b/hardware/MainBoard/Misc/BlockDiagram.pptx
@@ -305,7 +305,7 @@
             <a:fld id="{1D8BD707-D9CF-40AE-B4C6-C98DA3205C09}" type="datetimeFigureOut">
               <a:rPr lang="en-US" smtClean="0"/>
               <a:pPr/>
-              <a:t>2/13/2012</a:t>
+              <a:t>2/14/2012</a:t>
             </a:fld>
             <a:endParaRPr lang="en-US"/>
           </a:p>
@@ -472,7 +472,7 @@
             <a:fld id="{1D8BD707-D9CF-40AE-B4C6-C98DA3205C09}" type="datetimeFigureOut">
               <a:rPr lang="en-US" smtClean="0"/>
               <a:pPr/>
-              <a:t>2/13/2012</a:t>
+              <a:t>2/14/2012</a:t>
             </a:fld>
             <a:endParaRPr lang="en-US"/>
           </a:p>
@@ -649,7 +649,7 @@
             <a:fld id="{1D8BD707-D9CF-40AE-B4C6-C98DA3205C09}" type="datetimeFigureOut">
               <a:rPr lang="en-US" smtClean="0"/>
               <a:pPr/>
-              <a:t>2/13/2012</a:t>
+              <a:t>2/14/2012</a:t>
             </a:fld>
             <a:endParaRPr lang="en-US"/>
           </a:p>
@@ -816,7 +816,7 @@
             <a:fld id="{1D8BD707-D9CF-40AE-B4C6-C98DA3205C09}" type="datetimeFigureOut">
               <a:rPr lang="en-US" smtClean="0"/>
               <a:pPr/>
-              <a:t>2/13/2012</a:t>
+              <a:t>2/14/2012</a:t>
             </a:fld>
             <a:endParaRPr lang="en-US"/>
           </a:p>
@@ -1059,7 +1059,7 @@
             <a:fld id="{1D8BD707-D9CF-40AE-B4C6-C98DA3205C09}" type="datetimeFigureOut">
               <a:rPr lang="en-US" smtClean="0"/>
               <a:pPr/>
-              <a:t>2/13/2012</a:t>
+              <a:t>2/14/2012</a:t>
             </a:fld>
             <a:endParaRPr lang="en-US"/>
           </a:p>
@@ -1344,7 +1344,7 @@
             <a:fld id="{1D8BD707-D9CF-40AE-B4C6-C98DA3205C09}" type="datetimeFigureOut">
               <a:rPr lang="en-US" smtClean="0"/>
               <a:pPr/>
-              <a:t>2/13/2012</a:t>
+              <a:t>2/14/2012</a:t>
             </a:fld>
             <a:endParaRPr lang="en-US"/>
           </a:p>
@@ -1763,7 +1763,7 @@
             <a:fld id="{1D8BD707-D9CF-40AE-B4C6-C98DA3205C09}" type="datetimeFigureOut">
               <a:rPr lang="en-US" smtClean="0"/>
               <a:pPr/>
-              <a:t>2/13/2012</a:t>
+              <a:t>2/14/2012</a:t>
             </a:fld>
             <a:endParaRPr lang="en-US"/>
           </a:p>
@@ -1878,7 +1878,7 @@
             <a:fld id="{1D8BD707-D9CF-40AE-B4C6-C98DA3205C09}" type="datetimeFigureOut">
               <a:rPr lang="en-US" smtClean="0"/>
               <a:pPr/>
-              <a:t>2/13/2012</a:t>
+              <a:t>2/14/2012</a:t>
             </a:fld>
             <a:endParaRPr lang="en-US"/>
           </a:p>
@@ -1970,7 +1970,7 @@
             <a:fld id="{1D8BD707-D9CF-40AE-B4C6-C98DA3205C09}" type="datetimeFigureOut">
               <a:rPr lang="en-US" smtClean="0"/>
               <a:pPr/>
-              <a:t>2/13/2012</a:t>
+              <a:t>2/14/2012</a:t>
             </a:fld>
             <a:endParaRPr lang="en-US"/>
           </a:p>
@@ -2244,7 +2244,7 @@
             <a:fld id="{1D8BD707-D9CF-40AE-B4C6-C98DA3205C09}" type="datetimeFigureOut">
               <a:rPr lang="en-US" smtClean="0"/>
               <a:pPr/>
-              <a:t>2/13/2012</a:t>
+              <a:t>2/14/2012</a:t>
             </a:fld>
             <a:endParaRPr lang="en-US"/>
           </a:p>
@@ -2494,7 +2494,7 @@
             <a:fld id="{1D8BD707-D9CF-40AE-B4C6-C98DA3205C09}" type="datetimeFigureOut">
               <a:rPr lang="en-US" smtClean="0"/>
               <a:pPr/>
-              <a:t>2/13/2012</a:t>
+              <a:t>2/14/2012</a:t>
             </a:fld>
             <a:endParaRPr lang="en-US"/>
           </a:p>
@@ -2704,7 +2704,7 @@
             <a:fld id="{1D8BD707-D9CF-40AE-B4C6-C98DA3205C09}" type="datetimeFigureOut">
               <a:rPr lang="en-US" smtClean="0"/>
               <a:pPr/>
-              <a:t>2/13/2012</a:t>
+              <a:t>2/14/2012</a:t>
             </a:fld>
             <a:endParaRPr lang="en-US"/>
           </a:p>
@@ -3311,7 +3311,7 @@
         </p:nvCxnSpPr>
         <p:spPr>
           <a:xfrm rot="5400000">
-            <a:off x="4046220" y="1943100"/>
+            <a:off x="4000500" y="1943100"/>
             <a:ext cx="1143000" cy="1588"/>
           </a:xfrm>
           <a:prstGeom prst="straightConnector1">
@@ -3348,7 +3348,7 @@
         </p:nvCxnSpPr>
         <p:spPr>
           <a:xfrm rot="5400000">
-            <a:off x="4410789" y="1942703"/>
+            <a:off x="4365069" y="1942703"/>
             <a:ext cx="1143794" cy="1588"/>
           </a:xfrm>
           <a:prstGeom prst="straightConnector1">
@@ -3384,9 +3384,9 @@
           <p:nvPr/>
         </p:nvCxnSpPr>
         <p:spPr>
-          <a:xfrm rot="5400000">
-            <a:off x="3672046" y="1949926"/>
-            <a:ext cx="1158240" cy="1588"/>
+          <a:xfrm>
+            <a:off x="4206240" y="1371600"/>
+            <a:ext cx="0" cy="1143000"/>
           </a:xfrm>
           <a:prstGeom prst="straightConnector1">
             <a:avLst/>
@@ -3663,7 +3663,7 @@
         </p:nvSpPr>
         <p:spPr>
           <a:xfrm rot="16200000">
-            <a:off x="4604771" y="1784167"/>
+            <a:off x="4559051" y="1784167"/>
             <a:ext cx="425116" cy="307777"/>
           </a:xfrm>
           <a:prstGeom prst="rect">
@@ -3717,7 +3717,7 @@
         </p:nvSpPr>
         <p:spPr>
           <a:xfrm rot="16200000">
-            <a:off x="4226187" y="1784167"/>
+            <a:off x="4180467" y="1784167"/>
             <a:ext cx="450764" cy="307777"/>
           </a:xfrm>
           <a:prstGeom prst="rect">
@@ -3755,7 +3755,7 @@
         </p:nvSpPr>
         <p:spPr>
           <a:xfrm rot="16200000">
-            <a:off x="3786688" y="1784167"/>
+            <a:off x="3740968" y="1784167"/>
             <a:ext cx="598241" cy="307777"/>
           </a:xfrm>
           <a:prstGeom prst="rect">
@@ -3993,9 +3993,9 @@
           <p:nvPr/>
         </p:nvCxnSpPr>
         <p:spPr>
-          <a:xfrm rot="5400000">
-            <a:off x="3315494" y="1943100"/>
-            <a:ext cx="1142206" cy="794"/>
+          <a:xfrm>
+            <a:off x="3841274" y="1372394"/>
+            <a:ext cx="0" cy="1142206"/>
           </a:xfrm>
           <a:prstGeom prst="straightConnector1">
             <a:avLst/>
@@ -4259,7 +4259,7 @@
           </a:xfrm>
           <a:prstGeom prst="bentConnector3">
             <a:avLst>
-              <a:gd name="adj1" fmla="val 75412"/>
+              <a:gd name="adj1" fmla="val 77863"/>
             </a:avLst>
           </a:prstGeom>
           <a:ln w="31750">
@@ -4300,7 +4300,7 @@
           </a:xfrm>
           <a:prstGeom prst="bentConnector3">
             <a:avLst>
-              <a:gd name="adj1" fmla="val 19608"/>
+              <a:gd name="adj1" fmla="val 20833"/>
             </a:avLst>
           </a:prstGeom>
           <a:ln w="31750">
@@ -4555,8 +4555,8 @@
         </p:nvCxnSpPr>
         <p:spPr>
           <a:xfrm flipV="1">
-            <a:off x="3361335" y="1378806"/>
-            <a:ext cx="0" cy="1672171"/>
+            <a:off x="3337560" y="1378807"/>
+            <a:ext cx="0" cy="1684433"/>
           </a:xfrm>
           <a:prstGeom prst="straightConnector1">
             <a:avLst/>
@@ -4630,13 +4630,13 @@
         </p:nvCxnSpPr>
         <p:spPr>
           <a:xfrm flipV="1">
-            <a:off x="5746124" y="1372394"/>
+            <a:off x="5760720" y="1372394"/>
             <a:ext cx="1" cy="1233646"/>
           </a:xfrm>
           <a:prstGeom prst="straightConnector1">
             <a:avLst/>
           </a:prstGeom>
-          <a:ln w="31750">
+          <a:ln w="31750" cap="rnd">
             <a:solidFill>
               <a:schemeClr val="tx1"/>
             </a:solidFill>
@@ -4667,7 +4667,7 @@
         </p:nvSpPr>
         <p:spPr>
           <a:xfrm rot="16200000">
-            <a:off x="3357610" y="1815392"/>
+            <a:off x="3311890" y="1815392"/>
             <a:ext cx="724878" cy="307777"/>
           </a:xfrm>
           <a:prstGeom prst="rect">
@@ -4705,16 +4705,17 @@
         </p:nvCxnSpPr>
         <p:spPr>
           <a:xfrm flipH="1">
-            <a:off x="5746124" y="2611526"/>
-            <a:ext cx="1294756" cy="0"/>
+            <a:off x="5760721" y="2611526"/>
+            <a:ext cx="1280159" cy="0"/>
           </a:xfrm>
           <a:prstGeom prst="straightConnector1">
             <a:avLst/>
           </a:prstGeom>
-          <a:ln w="31750">
-            <a:solidFill>
-              <a:schemeClr val="tx1"/>
-            </a:solidFill>
+          <a:ln w="31750" cap="rnd">
+            <a:solidFill>
+              <a:schemeClr val="tx1"/>
+            </a:solidFill>
+            <a:round/>
             <a:headEnd type="triangle" w="lg" len="med"/>
             <a:tailEnd type="none" w="lg" len="med"/>
           </a:ln>
@@ -4742,7 +4743,7 @@
         </p:nvCxnSpPr>
         <p:spPr>
           <a:xfrm rot="5400000">
-            <a:off x="4778137" y="1942703"/>
+            <a:off x="4732417" y="1942703"/>
             <a:ext cx="1143794" cy="1588"/>
           </a:xfrm>
           <a:prstGeom prst="straightConnector1">
@@ -4779,7 +4780,7 @@
         </p:nvSpPr>
         <p:spPr>
           <a:xfrm rot="16200000">
-            <a:off x="4874784" y="1784167"/>
+            <a:off x="4829064" y="1784167"/>
             <a:ext cx="619786" cy="307777"/>
           </a:xfrm>
           <a:prstGeom prst="rect">
@@ -28230,11 +28231,6 @@
               </a:rPr>
               <a:t>100 MHz RC OSC</a:t>
             </a:r>
-            <a:endParaRPr lang="en-US" dirty="0" smtClean="0">
-              <a:solidFill>
-                <a:schemeClr val="tx1"/>
-              </a:solidFill>
-            </a:endParaRPr>
           </a:p>
         </p:txBody>
       </p:sp>
@@ -29959,23 +29955,7 @@
                   <a:schemeClr val="tx1"/>
                 </a:solidFill>
               </a:rPr>
-              <a:t>32 </a:t>
-            </a:r>
-            <a:r>
-              <a:rPr lang="en-US" dirty="0" smtClean="0">
-                <a:solidFill>
-                  <a:schemeClr val="tx1"/>
-                </a:solidFill>
-              </a:rPr>
-              <a:t>kHz</a:t>
-            </a:r>
-            <a:r>
-              <a:rPr lang="en-US" dirty="0" smtClean="0">
-                <a:solidFill>
-                  <a:schemeClr val="tx1"/>
-                </a:solidFill>
-              </a:rPr>
-              <a:t/>
+              <a:t>32 kHz</a:t>
             </a:r>
             <a:br>
               <a:rPr lang="en-US" dirty="0" smtClean="0">
@@ -32850,23 +32830,7 @@
                   <a:schemeClr val="tx1"/>
                 </a:solidFill>
               </a:rPr>
-              <a:t>32 </a:t>
-            </a:r>
-            <a:r>
-              <a:rPr lang="en-US" dirty="0" smtClean="0">
-                <a:solidFill>
-                  <a:schemeClr val="tx1"/>
-                </a:solidFill>
-              </a:rPr>
-              <a:t>kHz</a:t>
-            </a:r>
-            <a:r>
-              <a:rPr lang="en-US" dirty="0" smtClean="0">
-                <a:solidFill>
-                  <a:schemeClr val="tx1"/>
-                </a:solidFill>
-              </a:rPr>
-              <a:t/>
+              <a:t>32 kHz</a:t>
             </a:r>
             <a:br>
               <a:rPr lang="en-US" dirty="0" smtClean="0">

</xml_diff>